<commit_message>
py ch. script and plots
</commit_message>
<xml_diff>
--- a/schemi.pptx
+++ b/schemi.pptx
@@ -202,7 +202,7 @@
           <a:p>
             <a:fld id="{9B840559-1818-447A-8FDD-74221CA8CFD7}" type="datetimeFigureOut">
               <a:rPr lang="it-IT" smtClean="0"/>
-              <a:t>30/10/2017</a:t>
+              <a:t>08/11/2017</a:t>
             </a:fld>
             <a:endParaRPr lang="it-IT"/>
           </a:p>
@@ -368,7 +368,7 @@
           <a:p>
             <a:fld id="{D9628B44-116E-4AC9-81A3-4C647CEA36A4}" type="datetimeFigureOut">
               <a:rPr lang="it-IT" smtClean="0"/>
-              <a:t>30/10/2017</a:t>
+              <a:t>08/11/2017</a:t>
             </a:fld>
             <a:endParaRPr lang="it-IT"/>
           </a:p>
@@ -890,7 +890,7 @@
           <a:p>
             <a:fld id="{57580CA5-ED47-45B6-8120-CAF015EB459E}" type="datetime1">
               <a:rPr lang="it-IT" smtClean="0"/>
-              <a:t>30/10/2017</a:t>
+              <a:t>08/11/2017</a:t>
             </a:fld>
             <a:endParaRPr lang="it-IT"/>
           </a:p>
@@ -1060,7 +1060,7 @@
           <a:p>
             <a:fld id="{2482521E-5B5F-46C6-8284-CE671A226779}" type="datetime1">
               <a:rPr lang="it-IT" smtClean="0"/>
-              <a:t>30/10/2017</a:t>
+              <a:t>08/11/2017</a:t>
             </a:fld>
             <a:endParaRPr lang="it-IT"/>
           </a:p>
@@ -1240,7 +1240,7 @@
           <a:p>
             <a:fld id="{CAA815CE-BBF5-4C3B-A0E2-D9BDB12E9CBB}" type="datetime1">
               <a:rPr lang="it-IT" smtClean="0"/>
-              <a:t>30/10/2017</a:t>
+              <a:t>08/11/2017</a:t>
             </a:fld>
             <a:endParaRPr lang="it-IT"/>
           </a:p>
@@ -1410,7 +1410,7 @@
           <a:p>
             <a:fld id="{DEC976D0-C351-462F-AB42-486E91645429}" type="datetime1">
               <a:rPr lang="it-IT" smtClean="0"/>
-              <a:t>30/10/2017</a:t>
+              <a:t>08/11/2017</a:t>
             </a:fld>
             <a:endParaRPr lang="it-IT"/>
           </a:p>
@@ -1654,7 +1654,7 @@
           <a:p>
             <a:fld id="{5A250BCF-CD78-4276-916A-8441381CCF55}" type="datetime1">
               <a:rPr lang="it-IT" smtClean="0"/>
-              <a:t>30/10/2017</a:t>
+              <a:t>08/11/2017</a:t>
             </a:fld>
             <a:endParaRPr lang="it-IT"/>
           </a:p>
@@ -1886,7 +1886,7 @@
           <a:p>
             <a:fld id="{A055FE07-7396-463D-9709-FA03D9489DC7}" type="datetime1">
               <a:rPr lang="it-IT" smtClean="0"/>
-              <a:t>30/10/2017</a:t>
+              <a:t>08/11/2017</a:t>
             </a:fld>
             <a:endParaRPr lang="it-IT"/>
           </a:p>
@@ -2253,7 +2253,7 @@
           <a:p>
             <a:fld id="{8D2C0033-6627-4209-8F39-8EE446BC53F2}" type="datetime1">
               <a:rPr lang="it-IT" smtClean="0"/>
-              <a:t>30/10/2017</a:t>
+              <a:t>08/11/2017</a:t>
             </a:fld>
             <a:endParaRPr lang="it-IT"/>
           </a:p>
@@ -2371,7 +2371,7 @@
           <a:p>
             <a:fld id="{42243B2E-9F36-4BB4-ABB6-0D210C936F7B}" type="datetime1">
               <a:rPr lang="it-IT" smtClean="0"/>
-              <a:t>30/10/2017</a:t>
+              <a:t>08/11/2017</a:t>
             </a:fld>
             <a:endParaRPr lang="it-IT"/>
           </a:p>
@@ -2466,7 +2466,7 @@
           <a:p>
             <a:fld id="{DEFF256F-FBF3-43A0-A3A1-297F39035402}" type="datetime1">
               <a:rPr lang="it-IT" smtClean="0"/>
-              <a:t>30/10/2017</a:t>
+              <a:t>08/11/2017</a:t>
             </a:fld>
             <a:endParaRPr lang="it-IT"/>
           </a:p>
@@ -2743,7 +2743,7 @@
           <a:p>
             <a:fld id="{406AA2B0-BC11-4E5F-9031-AB0500432F52}" type="datetime1">
               <a:rPr lang="it-IT" smtClean="0"/>
-              <a:t>30/10/2017</a:t>
+              <a:t>08/11/2017</a:t>
             </a:fld>
             <a:endParaRPr lang="it-IT"/>
           </a:p>
@@ -3000,7 +3000,7 @@
           <a:p>
             <a:fld id="{522A6130-7118-43F9-846E-D910930FCAA8}" type="datetime1">
               <a:rPr lang="it-IT" smtClean="0"/>
-              <a:t>30/10/2017</a:t>
+              <a:t>08/11/2017</a:t>
             </a:fld>
             <a:endParaRPr lang="it-IT"/>
           </a:p>
@@ -3213,7 +3213,7 @@
           <a:p>
             <a:fld id="{6FEAE5C4-5E6A-4C15-9F30-16F4E4BB6BBE}" type="datetime1">
               <a:rPr lang="it-IT" smtClean="0"/>
-              <a:t>30/10/2017</a:t>
+              <a:t>08/11/2017</a:t>
             </a:fld>
             <a:endParaRPr lang="it-IT"/>
           </a:p>
@@ -5932,15 +5932,7 @@
                   <a:schemeClr val="bg1"/>
                 </a:solidFill>
               </a:rPr>
-              <a:t>(1+%</a:t>
-            </a:r>
-            <a:r>
-              <a:rPr lang="it-IT" sz="1400" baseline="-25000" dirty="0" err="1" smtClean="0">
-                <a:solidFill>
-                  <a:schemeClr val="bg1"/>
-                </a:solidFill>
-              </a:rPr>
-              <a:t>overhead</a:t>
+              <a:t>(</a:t>
             </a:r>
             <a:r>
               <a:rPr lang="it-IT" sz="1400" dirty="0" smtClean="0">
@@ -5948,8 +5940,13 @@
                   <a:schemeClr val="bg1"/>
                 </a:solidFill>
               </a:rPr>
-              <a:t>)</a:t>
-            </a:r>
+              <a:t>1+oh)</a:t>
+            </a:r>
+            <a:endParaRPr lang="it-IT" sz="1400" dirty="0" smtClean="0">
+              <a:solidFill>
+                <a:schemeClr val="bg1"/>
+              </a:solidFill>
+            </a:endParaRPr>
           </a:p>
         </p:txBody>
       </p:sp>
@@ -6070,15 +6067,7 @@
                   <a:schemeClr val="bg1"/>
                 </a:solidFill>
               </a:rPr>
-              <a:t>EF = 5000 </a:t>
-            </a:r>
-            <a:r>
-              <a:rPr lang="it-IT" sz="1400" dirty="0" err="1" smtClean="0">
-                <a:solidFill>
-                  <a:schemeClr val="bg1"/>
-                </a:solidFill>
-              </a:rPr>
-              <a:t>Bytes</a:t>
+              <a:t>EF</a:t>
             </a:r>
             <a:endParaRPr lang="it-IT" sz="1400" dirty="0">
               <a:solidFill>
@@ -6155,10 +6144,6 @@
               <a:rPr lang="it-IT" sz="1200" dirty="0" err="1" smtClean="0"/>
               <a:t>pkts</a:t>
             </a:r>
-            <a:r>
-              <a:rPr lang="it-IT" sz="1200" dirty="0" smtClean="0"/>
-              <a:t> (50+4 B)</a:t>
-            </a:r>
             <a:endParaRPr lang="it-IT" sz="1200" dirty="0"/>
           </a:p>
         </p:txBody>
@@ -6228,18 +6213,6 @@
             <a:r>
               <a:rPr lang="it-IT" sz="1200" dirty="0" err="1" smtClean="0"/>
               <a:t>pkts</a:t>
-            </a:r>
-            <a:r>
-              <a:rPr lang="it-IT" sz="1200" dirty="0" smtClean="0"/>
-              <a:t> (54 </a:t>
-            </a:r>
-            <a:r>
-              <a:rPr lang="it-IT" sz="1200" dirty="0" err="1" smtClean="0"/>
-              <a:t>Bytes</a:t>
-            </a:r>
-            <a:r>
-              <a:rPr lang="it-IT" sz="1200" dirty="0" smtClean="0"/>
-              <a:t>)</a:t>
             </a:r>
             <a:endParaRPr lang="it-IT" sz="1200" dirty="0"/>
           </a:p>
@@ -6881,11 +6854,7 @@
             </a:r>
             <a:r>
               <a:rPr lang="it-IT" sz="1200" dirty="0" smtClean="0"/>
-              <a:t>(403 </a:t>
-            </a:r>
-            <a:r>
-              <a:rPr lang="it-IT" sz="1200" dirty="0" smtClean="0"/>
-              <a:t>B):</a:t>
+              <a:t>(403 B):</a:t>
             </a:r>
           </a:p>
           <a:p>
@@ -6926,15 +6895,7 @@
             </a:r>
             <a:r>
               <a:rPr lang="it-IT" sz="1200" dirty="0" smtClean="0"/>
-              <a:t> data </a:t>
-            </a:r>
-            <a:r>
-              <a:rPr lang="it-IT" sz="1200" dirty="0" smtClean="0"/>
-              <a:t>(388 </a:t>
-            </a:r>
-            <a:r>
-              <a:rPr lang="it-IT" sz="1200" dirty="0" smtClean="0"/>
-              <a:t>B)</a:t>
+              <a:t> data (388 B)</a:t>
             </a:r>
           </a:p>
         </p:txBody>

</xml_diff>